<commit_message>
bug code ; Évolution du panier moyen par mois ; corrigé
</commit_message>
<xml_diff>
--- a/presentation_BENMAHAMMED_Oussama_Lapage.pptx
+++ b/presentation_BENMAHAMMED_Oussama_Lapage.pptx
@@ -5201,10 +5201,14 @@
         <a:lstStyle/>
         <a:p>
           <a:r>
-            <a:rPr lang="fr-FR"/>
-            <a:t>• Contexte du projet d'analyse des ventes.</a:t>
+            <a:rPr lang="fr-FR" dirty="0"/>
+            <a:t>• Projet : Analyse des ventes en ligne de la librairie </a:t>
           </a:r>
-          <a:endParaRPr lang="en-US"/>
+          <a:r>
+            <a:rPr lang="fr-FR" dirty="0" err="1"/>
+            <a:t>LaPage</a:t>
+          </a:r>
+          <a:endParaRPr lang="en-US" dirty="0"/>
         </a:p>
       </dgm:t>
     </dgm:pt>
@@ -5238,10 +5242,10 @@
         <a:lstStyle/>
         <a:p>
           <a:r>
-            <a:rPr lang="fr-FR"/>
+            <a:rPr lang="fr-FR" dirty="0"/>
             <a:t>• Objectifs: Comprendre les comportements d'achat, identifier les opportunités d'amélioration.</a:t>
           </a:r>
-          <a:endParaRPr lang="en-US"/>
+          <a:endParaRPr lang="en-US" dirty="0"/>
         </a:p>
       </dgm:t>
     </dgm:pt>
@@ -5411,7 +5415,7 @@
 <dgm:dataModel xmlns:dgm="http://schemas.openxmlformats.org/drawingml/2006/diagram" xmlns:a="http://schemas.openxmlformats.org/drawingml/2006/main">
   <dgm:ptLst>
     <dgm:pt modelId="{7C2CA66F-7247-4429-B55B-EBC5C694FE89}" type="doc">
-      <dgm:prSet loTypeId="urn:microsoft.com/office/officeart/2008/layout/LinedList" loCatId="list" qsTypeId="urn:microsoft.com/office/officeart/2005/8/quickstyle/simple1" qsCatId="simple" csTypeId="urn:microsoft.com/office/officeart/2005/8/colors/colorful2" csCatId="colorful"/>
+      <dgm:prSet loTypeId="urn:microsoft.com/office/officeart/2008/layout/LinedList" loCatId="list" qsTypeId="urn:microsoft.com/office/officeart/2005/8/quickstyle/simple1" qsCatId="simple" csTypeId="urn:microsoft.com/office/officeart/2005/8/colors/colorful2" csCatId="colorful" phldr="1"/>
       <dgm:spPr/>
       <dgm:t>
         <a:bodyPr/>
@@ -5429,10 +5433,10 @@
         <a:lstStyle/>
         <a:p>
           <a:r>
-            <a:rPr lang="fr-FR"/>
-            <a:t>Chiffre d'affaires total : 12,027,663.10 unités monétaires</a:t>
+            <a:rPr lang="fr-FR" dirty="0"/>
+            <a:t>Chiffre d'affaires total : 12,027,663.10 €</a:t>
           </a:r>
-          <a:endParaRPr lang="en-US"/>
+          <a:endParaRPr lang="en-US" dirty="0"/>
         </a:p>
       </dgm:t>
     </dgm:pt>
@@ -5503,10 +5507,10 @@
         <a:lstStyle/>
         <a:p>
           <a:r>
-            <a:rPr lang="fr-FR"/>
-            <a:t>Valeur moyenne d'une transaction : 34.81 unités monétaires</a:t>
+            <a:rPr lang="fr-FR" dirty="0"/>
+            <a:t>Valeur moyenne d'une transaction : 34.81 €</a:t>
           </a:r>
-          <a:endParaRPr lang="en-US"/>
+          <a:endParaRPr lang="en-US" dirty="0"/>
         </a:p>
       </dgm:t>
     </dgm:pt>
@@ -5540,10 +5544,10 @@
         <a:lstStyle/>
         <a:p>
           <a:r>
-            <a:rPr lang="fr-FR"/>
-            <a:t>Prix moyen des produits : 17.49 unités monétaires</a:t>
+            <a:rPr lang="fr-FR" dirty="0"/>
+            <a:t>Prix moyen des produits : 17.49 €</a:t>
           </a:r>
-          <a:endParaRPr lang="en-US"/>
+          <a:endParaRPr lang="en-US" dirty="0"/>
         </a:p>
       </dgm:t>
     </dgm:pt>
@@ -5650,11 +5654,7 @@
         <a:bodyPr/>
         <a:lstStyle/>
         <a:p>
-          <a:r>
-            <a:rPr lang="fr-FR"/>
-            <a:t>Taille moyenne du panier : 34.81 unités monétaires par transaction</a:t>
-          </a:r>
-          <a:endParaRPr lang="en-US"/>
+          <a:endParaRPr lang="en-US" dirty="0"/>
         </a:p>
       </dgm:t>
     </dgm:pt>
@@ -7046,12 +7046,8 @@
         <a:lstStyle/>
         <a:p>
           <a:r>
-            <a:rPr lang="fr-FR" b="0" i="0" baseline="0"/>
-            <a:t> </a:t>
-          </a:r>
-          <a:r>
             <a:rPr lang="fr-FR" b="0" i="0" baseline="0" dirty="0"/>
-            <a:t>Certaines catégories sont associées à des paniers moyens plus élevés.</a:t>
+            <a:t> Certaines catégories sont associées à des paniers moyens plus élevés.</a:t>
           </a:r>
           <a:endParaRPr lang="fr-FR" dirty="0"/>
         </a:p>
@@ -7087,12 +7083,8 @@
         <a:lstStyle/>
         <a:p>
           <a:r>
-            <a:rPr lang="fr-FR" b="0" i="0" baseline="0"/>
-            <a:t> </a:t>
-          </a:r>
-          <a:r>
             <a:rPr lang="fr-FR" b="0" i="0" baseline="0" dirty="0"/>
-            <a:t>Une fréquence d'achat plus élevée est souvent liée à un panier moyen plus faible.</a:t>
+            <a:t> Une fréquence d'achat plus élevée est souvent liée à un panier moyen plus faible.</a:t>
           </a:r>
           <a:endParaRPr lang="fr-FR" dirty="0"/>
         </a:p>
@@ -7447,10 +7439,10 @@
             </a:lnSpc>
           </a:pPr>
           <a:r>
-            <a:rPr lang="fr-FR"/>
-            <a:t>Adaptez les promotions selon les groupes d'âge pour maximiser l'engagement.</a:t>
+            <a:rPr lang="fr-FR" dirty="0"/>
+            <a:t>Adapter les promotions selon les groupes d'âge pour maximiser l'engagement.</a:t>
           </a:r>
-          <a:endParaRPr lang="en-US"/>
+          <a:endParaRPr lang="en-US" dirty="0"/>
         </a:p>
       </dgm:t>
     </dgm:pt>
@@ -7531,10 +7523,10 @@
             </a:lnSpc>
           </a:pPr>
           <a:r>
-            <a:rPr lang="fr-FR"/>
-            <a:t>Améliorez l'expérience utilisateur pour réduire les abandons de panier.</a:t>
+            <a:rPr lang="fr-FR" dirty="0"/>
+            <a:t>Améliorer l'expérience utilisateur pour réduire les abandons de panier.</a:t>
           </a:r>
-          <a:endParaRPr lang="en-US"/>
+          <a:endParaRPr lang="en-US" dirty="0"/>
         </a:p>
       </dgm:t>
     </dgm:pt>
@@ -7615,10 +7607,10 @@
             </a:lnSpc>
           </a:pPr>
           <a:r>
-            <a:rPr lang="fr-FR"/>
-            <a:t>Concentrez vos efforts marketing sur les catégories générant des paniers élevés.</a:t>
+            <a:rPr lang="fr-FR" dirty="0"/>
+            <a:t>Concentrer les efforts marketing sur les catégories générant des paniers élevés.</a:t>
           </a:r>
-          <a:endParaRPr lang="en-US"/>
+          <a:endParaRPr lang="en-US" dirty="0"/>
         </a:p>
       </dgm:t>
     </dgm:pt>
@@ -7699,10 +7691,26 @@
             </a:lnSpc>
           </a:pPr>
           <a:r>
-            <a:rPr lang="fr-FR"/>
-            <a:t>Utilisez des stratégies d'upselling et de cross-selling pour augmenter la valeur des paniers.</a:t>
+            <a:rPr lang="fr-FR" dirty="0"/>
+            <a:t>Utiliser des stratégies d'</a:t>
           </a:r>
-          <a:endParaRPr lang="en-US"/>
+          <a:r>
+            <a:rPr lang="fr-FR" dirty="0" err="1"/>
+            <a:t>upselling</a:t>
+          </a:r>
+          <a:r>
+            <a:rPr lang="fr-FR" dirty="0"/>
+            <a:t> et de cross-</a:t>
+          </a:r>
+          <a:r>
+            <a:rPr lang="fr-FR" dirty="0" err="1"/>
+            <a:t>selling</a:t>
+          </a:r>
+          <a:r>
+            <a:rPr lang="fr-FR" dirty="0"/>
+            <a:t> pour augmenter la valeur des paniers.</a:t>
+          </a:r>
+          <a:endParaRPr lang="en-US" dirty="0"/>
         </a:p>
       </dgm:t>
     </dgm:pt>
@@ -8175,10 +8183,14 @@
             <a:buNone/>
           </a:pPr>
           <a:r>
-            <a:rPr lang="fr-FR" sz="2500" kern="1200"/>
-            <a:t>• Contexte du projet d'analyse des ventes.</a:t>
+            <a:rPr lang="fr-FR" sz="2500" kern="1200" dirty="0"/>
+            <a:t>• Projet : Analyse des ventes en ligne de la librairie </a:t>
           </a:r>
-          <a:endParaRPr lang="en-US" sz="2500" kern="1200"/>
+          <a:r>
+            <a:rPr lang="fr-FR" sz="2500" kern="1200" dirty="0" err="1"/>
+            <a:t>LaPage</a:t>
+          </a:r>
+          <a:endParaRPr lang="en-US" sz="2500" kern="1200" dirty="0"/>
         </a:p>
       </dsp:txBody>
       <dsp:txXfrm>
@@ -8327,10 +8339,10 @@
             <a:buNone/>
           </a:pPr>
           <a:r>
-            <a:rPr lang="fr-FR" sz="2500" kern="1200"/>
+            <a:rPr lang="fr-FR" sz="2500" kern="1200" dirty="0"/>
             <a:t>• Objectifs: Comprendre les comportements d'achat, identifier les opportunités d'amélioration.</a:t>
           </a:r>
-          <a:endParaRPr lang="en-US" sz="2500" kern="1200"/>
+          <a:endParaRPr lang="en-US" sz="2500" kern="1200" dirty="0"/>
         </a:p>
       </dsp:txBody>
       <dsp:txXfrm>
@@ -8357,7 +8369,7 @@
       </dsp:nvSpPr>
       <dsp:spPr>
         <a:xfrm>
-          <a:off x="0" y="689"/>
+          <a:off x="0" y="730"/>
           <a:ext cx="6797675" cy="0"/>
         </a:xfrm>
         <a:prstGeom prst="line">
@@ -8406,8 +8418,8 @@
       </dsp:nvSpPr>
       <dsp:spPr>
         <a:xfrm>
-          <a:off x="0" y="689"/>
-          <a:ext cx="6797675" cy="806933"/>
+          <a:off x="0" y="730"/>
+          <a:ext cx="6797675" cy="854758"/>
         </a:xfrm>
         <a:prstGeom prst="rect">
           <a:avLst/>
@@ -8431,12 +8443,12 @@
         <a:fontRef idx="minor"/>
       </dsp:style>
       <dsp:txBody>
-        <a:bodyPr spcFirstLastPara="0" vert="horz" wrap="square" lIns="83820" tIns="83820" rIns="83820" bIns="83820" numCol="1" spcCol="1270" anchor="t" anchorCtr="0">
+        <a:bodyPr spcFirstLastPara="0" vert="horz" wrap="square" lIns="91440" tIns="91440" rIns="91440" bIns="91440" numCol="1" spcCol="1270" anchor="t" anchorCtr="0">
           <a:noAutofit/>
         </a:bodyPr>
         <a:lstStyle/>
         <a:p>
-          <a:pPr marL="0" lvl="0" indent="0" algn="l" defTabSz="977900">
+          <a:pPr marL="0" lvl="0" indent="0" algn="l" defTabSz="1066800">
             <a:lnSpc>
               <a:spcPct val="90000"/>
             </a:lnSpc>
@@ -8449,15 +8461,15 @@
             <a:buNone/>
           </a:pPr>
           <a:r>
-            <a:rPr lang="fr-FR" sz="2200" kern="1200"/>
-            <a:t>Chiffre d'affaires total : 12,027,663.10 unités monétaires</a:t>
+            <a:rPr lang="fr-FR" sz="2400" kern="1200" dirty="0"/>
+            <a:t>Chiffre d'affaires total : 12,027,663.10 €</a:t>
           </a:r>
-          <a:endParaRPr lang="en-US" sz="2200" kern="1200"/>
+          <a:endParaRPr lang="en-US" sz="2400" kern="1200" dirty="0"/>
         </a:p>
       </dsp:txBody>
       <dsp:txXfrm>
-        <a:off x="0" y="689"/>
-        <a:ext cx="6797675" cy="806933"/>
+        <a:off x="0" y="730"/>
+        <a:ext cx="6797675" cy="854758"/>
       </dsp:txXfrm>
     </dsp:sp>
     <dsp:sp modelId="{AF4B59F2-20D6-4942-A219-EDB3A5029616}">
@@ -8467,7 +8479,7 @@
       </dsp:nvSpPr>
       <dsp:spPr>
         <a:xfrm>
-          <a:off x="0" y="807622"/>
+          <a:off x="0" y="855489"/>
           <a:ext cx="6797675" cy="0"/>
         </a:xfrm>
         <a:prstGeom prst="line">
@@ -8516,8 +8528,8 @@
       </dsp:nvSpPr>
       <dsp:spPr>
         <a:xfrm>
-          <a:off x="0" y="807622"/>
-          <a:ext cx="6797675" cy="806933"/>
+          <a:off x="0" y="855489"/>
+          <a:ext cx="6797675" cy="854758"/>
         </a:xfrm>
         <a:prstGeom prst="rect">
           <a:avLst/>
@@ -8541,12 +8553,12 @@
         <a:fontRef idx="minor"/>
       </dsp:style>
       <dsp:txBody>
-        <a:bodyPr spcFirstLastPara="0" vert="horz" wrap="square" lIns="83820" tIns="83820" rIns="83820" bIns="83820" numCol="1" spcCol="1270" anchor="t" anchorCtr="0">
+        <a:bodyPr spcFirstLastPara="0" vert="horz" wrap="square" lIns="91440" tIns="91440" rIns="91440" bIns="91440" numCol="1" spcCol="1270" anchor="t" anchorCtr="0">
           <a:noAutofit/>
         </a:bodyPr>
         <a:lstStyle/>
         <a:p>
-          <a:pPr marL="0" lvl="0" indent="0" algn="l" defTabSz="977900">
+          <a:pPr marL="0" lvl="0" indent="0" algn="l" defTabSz="1066800">
             <a:lnSpc>
               <a:spcPct val="90000"/>
             </a:lnSpc>
@@ -8559,15 +8571,15 @@
             <a:buNone/>
           </a:pPr>
           <a:r>
-            <a:rPr lang="fr-FR" sz="2200" kern="1200"/>
+            <a:rPr lang="fr-FR" sz="2400" kern="1200"/>
             <a:t>Nombre total de transactions : 345,506 transactions</a:t>
           </a:r>
-          <a:endParaRPr lang="en-US" sz="2200" kern="1200"/>
+          <a:endParaRPr lang="en-US" sz="2400" kern="1200"/>
         </a:p>
       </dsp:txBody>
       <dsp:txXfrm>
-        <a:off x="0" y="807622"/>
-        <a:ext cx="6797675" cy="806933"/>
+        <a:off x="0" y="855489"/>
+        <a:ext cx="6797675" cy="854758"/>
       </dsp:txXfrm>
     </dsp:sp>
     <dsp:sp modelId="{7F37BBEC-D10E-4E14-B927-7CD0AA8DCABE}">
@@ -8577,7 +8589,7 @@
       </dsp:nvSpPr>
       <dsp:spPr>
         <a:xfrm>
-          <a:off x="0" y="1614556"/>
+          <a:off x="0" y="1710248"/>
           <a:ext cx="6797675" cy="0"/>
         </a:xfrm>
         <a:prstGeom prst="line">
@@ -8626,8 +8638,8 @@
       </dsp:nvSpPr>
       <dsp:spPr>
         <a:xfrm>
-          <a:off x="0" y="1614556"/>
-          <a:ext cx="6797675" cy="806933"/>
+          <a:off x="0" y="1710248"/>
+          <a:ext cx="6797675" cy="854758"/>
         </a:xfrm>
         <a:prstGeom prst="rect">
           <a:avLst/>
@@ -8651,12 +8663,12 @@
         <a:fontRef idx="minor"/>
       </dsp:style>
       <dsp:txBody>
-        <a:bodyPr spcFirstLastPara="0" vert="horz" wrap="square" lIns="83820" tIns="83820" rIns="83820" bIns="83820" numCol="1" spcCol="1270" anchor="t" anchorCtr="0">
+        <a:bodyPr spcFirstLastPara="0" vert="horz" wrap="square" lIns="91440" tIns="91440" rIns="91440" bIns="91440" numCol="1" spcCol="1270" anchor="t" anchorCtr="0">
           <a:noAutofit/>
         </a:bodyPr>
         <a:lstStyle/>
         <a:p>
-          <a:pPr marL="0" lvl="0" indent="0" algn="l" defTabSz="977900">
+          <a:pPr marL="0" lvl="0" indent="0" algn="l" defTabSz="1066800">
             <a:lnSpc>
               <a:spcPct val="90000"/>
             </a:lnSpc>
@@ -8669,15 +8681,15 @@
             <a:buNone/>
           </a:pPr>
           <a:r>
-            <a:rPr lang="fr-FR" sz="2200" kern="1200"/>
-            <a:t>Valeur moyenne d'une transaction : 34.81 unités monétaires</a:t>
+            <a:rPr lang="fr-FR" sz="2400" kern="1200" dirty="0"/>
+            <a:t>Valeur moyenne d'une transaction : 34.81 €</a:t>
           </a:r>
-          <a:endParaRPr lang="en-US" sz="2200" kern="1200"/>
+          <a:endParaRPr lang="en-US" sz="2400" kern="1200" dirty="0"/>
         </a:p>
       </dsp:txBody>
       <dsp:txXfrm>
-        <a:off x="0" y="1614556"/>
-        <a:ext cx="6797675" cy="806933"/>
+        <a:off x="0" y="1710248"/>
+        <a:ext cx="6797675" cy="854758"/>
       </dsp:txXfrm>
     </dsp:sp>
     <dsp:sp modelId="{239EF3C0-7FD0-4A4C-BDD8-DE1D4D1035B3}">
@@ -8687,7 +8699,7 @@
       </dsp:nvSpPr>
       <dsp:spPr>
         <a:xfrm>
-          <a:off x="0" y="2421489"/>
+          <a:off x="0" y="2565007"/>
           <a:ext cx="6797675" cy="0"/>
         </a:xfrm>
         <a:prstGeom prst="line">
@@ -8736,8 +8748,8 @@
       </dsp:nvSpPr>
       <dsp:spPr>
         <a:xfrm>
-          <a:off x="0" y="2421489"/>
-          <a:ext cx="6797675" cy="806933"/>
+          <a:off x="0" y="2565007"/>
+          <a:ext cx="6797675" cy="854758"/>
         </a:xfrm>
         <a:prstGeom prst="rect">
           <a:avLst/>
@@ -8761,12 +8773,12 @@
         <a:fontRef idx="minor"/>
       </dsp:style>
       <dsp:txBody>
-        <a:bodyPr spcFirstLastPara="0" vert="horz" wrap="square" lIns="83820" tIns="83820" rIns="83820" bIns="83820" numCol="1" spcCol="1270" anchor="t" anchorCtr="0">
+        <a:bodyPr spcFirstLastPara="0" vert="horz" wrap="square" lIns="91440" tIns="91440" rIns="91440" bIns="91440" numCol="1" spcCol="1270" anchor="t" anchorCtr="0">
           <a:noAutofit/>
         </a:bodyPr>
         <a:lstStyle/>
         <a:p>
-          <a:pPr marL="0" lvl="0" indent="0" algn="l" defTabSz="977900">
+          <a:pPr marL="0" lvl="0" indent="0" algn="l" defTabSz="1066800">
             <a:lnSpc>
               <a:spcPct val="90000"/>
             </a:lnSpc>
@@ -8779,15 +8791,15 @@
             <a:buNone/>
           </a:pPr>
           <a:r>
-            <a:rPr lang="fr-FR" sz="2200" kern="1200"/>
-            <a:t>Prix moyen des produits : 17.49 unités monétaires</a:t>
+            <a:rPr lang="fr-FR" sz="2400" kern="1200" dirty="0"/>
+            <a:t>Prix moyen des produits : 17.49 €</a:t>
           </a:r>
-          <a:endParaRPr lang="en-US" sz="2200" kern="1200"/>
+          <a:endParaRPr lang="en-US" sz="2400" kern="1200" dirty="0"/>
         </a:p>
       </dsp:txBody>
       <dsp:txXfrm>
-        <a:off x="0" y="2421489"/>
-        <a:ext cx="6797675" cy="806933"/>
+        <a:off x="0" y="2565007"/>
+        <a:ext cx="6797675" cy="854758"/>
       </dsp:txXfrm>
     </dsp:sp>
     <dsp:sp modelId="{A68A5096-D412-4811-A7A5-62CF883FD70D}">
@@ -8797,7 +8809,7 @@
       </dsp:nvSpPr>
       <dsp:spPr>
         <a:xfrm>
-          <a:off x="0" y="3228422"/>
+          <a:off x="0" y="3419765"/>
           <a:ext cx="6797675" cy="0"/>
         </a:xfrm>
         <a:prstGeom prst="line">
@@ -8846,8 +8858,8 @@
       </dsp:nvSpPr>
       <dsp:spPr>
         <a:xfrm>
-          <a:off x="0" y="3228422"/>
-          <a:ext cx="6797675" cy="806933"/>
+          <a:off x="0" y="3419765"/>
+          <a:ext cx="6797675" cy="854758"/>
         </a:xfrm>
         <a:prstGeom prst="rect">
           <a:avLst/>
@@ -8871,12 +8883,12 @@
         <a:fontRef idx="minor"/>
       </dsp:style>
       <dsp:txBody>
-        <a:bodyPr spcFirstLastPara="0" vert="horz" wrap="square" lIns="83820" tIns="83820" rIns="83820" bIns="83820" numCol="1" spcCol="1270" anchor="t" anchorCtr="0">
+        <a:bodyPr spcFirstLastPara="0" vert="horz" wrap="square" lIns="91440" tIns="91440" rIns="91440" bIns="91440" numCol="1" spcCol="1270" anchor="t" anchorCtr="0">
           <a:noAutofit/>
         </a:bodyPr>
         <a:lstStyle/>
         <a:p>
-          <a:pPr marL="0" lvl="0" indent="0" algn="l" defTabSz="977900">
+          <a:pPr marL="0" lvl="0" indent="0" algn="l" defTabSz="1066800">
             <a:lnSpc>
               <a:spcPct val="90000"/>
             </a:lnSpc>
@@ -8889,15 +8901,15 @@
             <a:buNone/>
           </a:pPr>
           <a:r>
-            <a:rPr lang="fr-FR" sz="2200" kern="1200"/>
+            <a:rPr lang="fr-FR" sz="2400" kern="1200"/>
             <a:t>Nombre total de clients : 8,601 clients</a:t>
           </a:r>
-          <a:endParaRPr lang="en-US" sz="2200" kern="1200"/>
+          <a:endParaRPr lang="en-US" sz="2400" kern="1200"/>
         </a:p>
       </dsp:txBody>
       <dsp:txXfrm>
-        <a:off x="0" y="3228422"/>
-        <a:ext cx="6797675" cy="806933"/>
+        <a:off x="0" y="3419765"/>
+        <a:ext cx="6797675" cy="854758"/>
       </dsp:txXfrm>
     </dsp:sp>
     <dsp:sp modelId="{1199364B-B706-4C79-AE1D-52BAF91C33DE}">
@@ -8907,7 +8919,7 @@
       </dsp:nvSpPr>
       <dsp:spPr>
         <a:xfrm>
-          <a:off x="0" y="4035355"/>
+          <a:off x="0" y="4274524"/>
           <a:ext cx="6797675" cy="0"/>
         </a:xfrm>
         <a:prstGeom prst="line">
@@ -8956,8 +8968,8 @@
       </dsp:nvSpPr>
       <dsp:spPr>
         <a:xfrm>
-          <a:off x="0" y="4035355"/>
-          <a:ext cx="6797675" cy="806933"/>
+          <a:off x="0" y="4274524"/>
+          <a:ext cx="6797675" cy="854758"/>
         </a:xfrm>
         <a:prstGeom prst="rect">
           <a:avLst/>
@@ -8981,12 +8993,12 @@
         <a:fontRef idx="minor"/>
       </dsp:style>
       <dsp:txBody>
-        <a:bodyPr spcFirstLastPara="0" vert="horz" wrap="square" lIns="83820" tIns="83820" rIns="83820" bIns="83820" numCol="1" spcCol="1270" anchor="t" anchorCtr="0">
+        <a:bodyPr spcFirstLastPara="0" vert="horz" wrap="square" lIns="91440" tIns="91440" rIns="91440" bIns="91440" numCol="1" spcCol="1270" anchor="t" anchorCtr="0">
           <a:noAutofit/>
         </a:bodyPr>
         <a:lstStyle/>
         <a:p>
-          <a:pPr marL="0" lvl="0" indent="0" algn="l" defTabSz="977900">
+          <a:pPr marL="0" lvl="0" indent="0" algn="l" defTabSz="1066800">
             <a:lnSpc>
               <a:spcPct val="90000"/>
             </a:lnSpc>
@@ -8999,15 +9011,15 @@
             <a:buNone/>
           </a:pPr>
           <a:r>
-            <a:rPr lang="fr-FR" sz="2200" kern="1200"/>
+            <a:rPr lang="fr-FR" sz="2400" kern="1200"/>
             <a:t>Fréquence d'achat moyenne par client : 40.17 transactions par client</a:t>
           </a:r>
-          <a:endParaRPr lang="en-US" sz="2200" kern="1200"/>
+          <a:endParaRPr lang="en-US" sz="2400" kern="1200"/>
         </a:p>
       </dsp:txBody>
       <dsp:txXfrm>
-        <a:off x="0" y="4035355"/>
-        <a:ext cx="6797675" cy="806933"/>
+        <a:off x="0" y="4274524"/>
+        <a:ext cx="6797675" cy="854758"/>
       </dsp:txXfrm>
     </dsp:sp>
     <dsp:sp modelId="{90A73A05-4E35-46C6-8628-D4B89DB2CB00}">
@@ -9017,7 +9029,7 @@
       </dsp:nvSpPr>
       <dsp:spPr>
         <a:xfrm>
-          <a:off x="0" y="4842289"/>
+          <a:off x="0" y="5129283"/>
           <a:ext cx="6797675" cy="0"/>
         </a:xfrm>
         <a:prstGeom prst="line">
@@ -9066,8 +9078,8 @@
       </dsp:nvSpPr>
       <dsp:spPr>
         <a:xfrm>
-          <a:off x="0" y="4842289"/>
-          <a:ext cx="6797675" cy="806933"/>
+          <a:off x="0" y="5129283"/>
+          <a:ext cx="6797675" cy="854758"/>
         </a:xfrm>
         <a:prstGeom prst="rect">
           <a:avLst/>
@@ -9091,12 +9103,12 @@
         <a:fontRef idx="minor"/>
       </dsp:style>
       <dsp:txBody>
-        <a:bodyPr spcFirstLastPara="0" vert="horz" wrap="square" lIns="83820" tIns="83820" rIns="83820" bIns="83820" numCol="1" spcCol="1270" anchor="t" anchorCtr="0">
+        <a:bodyPr spcFirstLastPara="0" vert="horz" wrap="square" lIns="91440" tIns="91440" rIns="91440" bIns="91440" numCol="1" spcCol="1270" anchor="t" anchorCtr="0">
           <a:noAutofit/>
         </a:bodyPr>
         <a:lstStyle/>
         <a:p>
-          <a:pPr marL="0" lvl="0" indent="0" algn="l" defTabSz="977900">
+          <a:pPr marL="0" lvl="0" indent="0" algn="l" defTabSz="1066800">
             <a:lnSpc>
               <a:spcPct val="90000"/>
             </a:lnSpc>
@@ -9108,16 +9120,12 @@
             </a:spcAft>
             <a:buNone/>
           </a:pPr>
-          <a:r>
-            <a:rPr lang="fr-FR" sz="2200" kern="1200"/>
-            <a:t>Taille moyenne du panier : 34.81 unités monétaires par transaction</a:t>
-          </a:r>
-          <a:endParaRPr lang="en-US" sz="2200" kern="1200"/>
+          <a:endParaRPr lang="en-US" sz="2400" kern="1200" dirty="0"/>
         </a:p>
       </dsp:txBody>
       <dsp:txXfrm>
-        <a:off x="0" y="4842289"/>
-        <a:ext cx="6797675" cy="806933"/>
+        <a:off x="0" y="5129283"/>
+        <a:ext cx="6797675" cy="854758"/>
       </dsp:txXfrm>
     </dsp:sp>
   </dsp:spTree>
@@ -11375,12 +11383,8 @@
             <a:buChar char="•"/>
           </a:pPr>
           <a:r>
-            <a:rPr lang="fr-FR" sz="1500" b="0" i="0" kern="1200" baseline="0"/>
-            <a:t> </a:t>
-          </a:r>
-          <a:r>
             <a:rPr lang="fr-FR" sz="1500" b="0" i="0" kern="1200" baseline="0" dirty="0"/>
-            <a:t>Certaines catégories sont associées à des paniers moyens plus élevés.</a:t>
+            <a:t> Certaines catégories sont associées à des paniers moyens plus élevés.</a:t>
           </a:r>
           <a:endParaRPr lang="fr-FR" sz="1500" kern="1200" dirty="0"/>
         </a:p>
@@ -11537,12 +11541,8 @@
             <a:buChar char="•"/>
           </a:pPr>
           <a:r>
-            <a:rPr lang="fr-FR" sz="1500" b="0" i="0" kern="1200" baseline="0"/>
-            <a:t> </a:t>
-          </a:r>
-          <a:r>
             <a:rPr lang="fr-FR" sz="1500" b="0" i="0" kern="1200" baseline="0" dirty="0"/>
-            <a:t>Une fréquence d'achat plus élevée est souvent liée à un panier moyen plus faible.</a:t>
+            <a:t> Une fréquence d'achat plus élevée est souvent liée à un panier moyen plus faible.</a:t>
           </a:r>
           <a:endParaRPr lang="fr-FR" sz="1500" kern="1200" dirty="0"/>
         </a:p>
@@ -12160,10 +12160,10 @@
             <a:buNone/>
           </a:pPr>
           <a:r>
-            <a:rPr lang="fr-FR" sz="1300" kern="1200"/>
-            <a:t>Adaptez les promotions selon les groupes d'âge pour maximiser l'engagement.</a:t>
+            <a:rPr lang="fr-FR" sz="1300" kern="1200" dirty="0"/>
+            <a:t>Adapter les promotions selon les groupes d'âge pour maximiser l'engagement.</a:t>
           </a:r>
-          <a:endParaRPr lang="en-US" sz="1300" kern="1200"/>
+          <a:endParaRPr lang="en-US" sz="1300" kern="1200" dirty="0"/>
         </a:p>
       </dsp:txBody>
       <dsp:txXfrm>
@@ -12373,10 +12373,10 @@
             <a:buNone/>
           </a:pPr>
           <a:r>
-            <a:rPr lang="fr-FR" sz="1300" kern="1200"/>
-            <a:t>Améliorez l'expérience utilisateur pour réduire les abandons de panier.</a:t>
+            <a:rPr lang="fr-FR" sz="1300" kern="1200" dirty="0"/>
+            <a:t>Améliorer l'expérience utilisateur pour réduire les abandons de panier.</a:t>
           </a:r>
-          <a:endParaRPr lang="en-US" sz="1300" kern="1200"/>
+          <a:endParaRPr lang="en-US" sz="1300" kern="1200" dirty="0"/>
         </a:p>
       </dsp:txBody>
       <dsp:txXfrm>
@@ -12586,10 +12586,10 @@
             <a:buNone/>
           </a:pPr>
           <a:r>
-            <a:rPr lang="fr-FR" sz="1300" kern="1200"/>
-            <a:t>Concentrez vos efforts marketing sur les catégories générant des paniers élevés.</a:t>
+            <a:rPr lang="fr-FR" sz="1300" kern="1200" dirty="0"/>
+            <a:t>Concentrer les efforts marketing sur les catégories générant des paniers élevés.</a:t>
           </a:r>
-          <a:endParaRPr lang="en-US" sz="1300" kern="1200"/>
+          <a:endParaRPr lang="en-US" sz="1300" kern="1200" dirty="0"/>
         </a:p>
       </dsp:txBody>
       <dsp:txXfrm>
@@ -12799,10 +12799,26 @@
             <a:buNone/>
           </a:pPr>
           <a:r>
-            <a:rPr lang="fr-FR" sz="1300" kern="1200"/>
-            <a:t>Utilisez des stratégies d'upselling et de cross-selling pour augmenter la valeur des paniers.</a:t>
+            <a:rPr lang="fr-FR" sz="1300" kern="1200" dirty="0"/>
+            <a:t>Utiliser des stratégies d'</a:t>
           </a:r>
-          <a:endParaRPr lang="en-US" sz="1300" kern="1200"/>
+          <a:r>
+            <a:rPr lang="fr-FR" sz="1300" kern="1200" dirty="0" err="1"/>
+            <a:t>upselling</a:t>
+          </a:r>
+          <a:r>
+            <a:rPr lang="fr-FR" sz="1300" kern="1200" dirty="0"/>
+            <a:t> et de cross-</a:t>
+          </a:r>
+          <a:r>
+            <a:rPr lang="fr-FR" sz="1300" kern="1200" dirty="0" err="1"/>
+            <a:t>selling</a:t>
+          </a:r>
+          <a:r>
+            <a:rPr lang="fr-FR" sz="1300" kern="1200" dirty="0"/>
+            <a:t> pour augmenter la valeur des paniers.</a:t>
+          </a:r>
+          <a:endParaRPr lang="en-US" sz="1300" kern="1200" dirty="0"/>
         </a:p>
       </dsp:txBody>
       <dsp:txXfrm>
@@ -20786,7 +20802,7 @@
           <a:p>
             <a:fld id="{EC932BF4-BDBC-4DE8-AC4B-68BE73229C40}" type="datetimeFigureOut">
               <a:rPr lang="fr-FR" smtClean="0"/>
-              <a:t>30/08/2024</a:t>
+              <a:t>02/09/2024</a:t>
             </a:fld>
             <a:endParaRPr lang="fr-FR"/>
           </a:p>
@@ -20970,7 +20986,7 @@
           <a:p>
             <a:fld id="{A2BA23EC-747F-4C3E-9ABD-88D6EB4682AA}" type="datetimeFigureOut">
               <a:rPr lang="fr-FR" smtClean="0"/>
-              <a:t>30/08/2024</a:t>
+              <a:t>02/09/2024</a:t>
             </a:fld>
             <a:endParaRPr lang="fr-FR"/>
           </a:p>
@@ -21472,7 +21488,7 @@
           <a:p>
             <a:fld id="{9FFF28AA-B17D-4025-98F6-2904083EA119}" type="datetime1">
               <a:rPr lang="fr-FR" smtClean="0"/>
-              <a:t>30/08/2024</a:t>
+              <a:t>02/09/2024</a:t>
             </a:fld>
             <a:endParaRPr lang="fr-FR" dirty="0"/>
           </a:p>
@@ -22337,7 +22353,7 @@
           <a:p>
             <a:fld id="{51C9A0E8-ED33-4F7C-B553-BA4D03CE1D0C}" type="datetime1">
               <a:rPr lang="fr-FR" smtClean="0"/>
-              <a:t>30/08/2024</a:t>
+              <a:t>02/09/2024</a:t>
             </a:fld>
             <a:endParaRPr lang="fr-FR"/>
           </a:p>
@@ -22638,7 +22654,7 @@
           <a:p>
             <a:fld id="{A1EACEFF-C559-4FA6-BE25-CE584983C19A}" type="datetime1">
               <a:rPr lang="fr-FR" smtClean="0"/>
-              <a:t>30/08/2024</a:t>
+              <a:t>02/09/2024</a:t>
             </a:fld>
             <a:endParaRPr lang="fr-FR" dirty="0"/>
           </a:p>
@@ -22891,7 +22907,7 @@
           <a:p>
             <a:fld id="{FD9D5DBE-A5C1-4EB8-8645-3EF187949EEF}" type="datetimeFigureOut">
               <a:rPr lang="fr-FR" smtClean="0"/>
-              <a:t>30/08/2024</a:t>
+              <a:t>02/09/2024</a:t>
             </a:fld>
             <a:endParaRPr lang="fr-FR"/>
           </a:p>
@@ -23089,7 +23105,7 @@
           <a:p>
             <a:fld id="{626AE022-6398-487F-B193-E0FDD9CEA2A7}" type="datetimeFigureOut">
               <a:rPr lang="fr-FR" smtClean="0"/>
-              <a:t>30/08/2024</a:t>
+              <a:t>02/09/2024</a:t>
             </a:fld>
             <a:endParaRPr lang="fr-FR"/>
           </a:p>
@@ -26024,7 +26040,7 @@
           <a:p>
             <a:fld id="{64FFD234-86A6-485D-A415-65C7F3A3892F}" type="datetime1">
               <a:rPr lang="fr-FR" smtClean="0"/>
-              <a:t>30/08/2024</a:t>
+              <a:t>02/09/2024</a:t>
             </a:fld>
             <a:endParaRPr lang="fr-FR" dirty="0"/>
           </a:p>
@@ -33389,7 +33405,7 @@
               <a:buAutoNum type="arabicPeriod"/>
             </a:pPr>
             <a:r>
-              <a:rPr lang="en-US"/>
+              <a:rPr lang="en-US" dirty="0"/>
               <a:t>Introduction</a:t>
             </a:r>
           </a:p>
@@ -33399,8 +33415,35 @@
               <a:buAutoNum type="arabicPeriod"/>
             </a:pPr>
             <a:r>
-              <a:rPr lang="en-US"/>
-              <a:t>KPIs et Indicateurs Clés</a:t>
+              <a:rPr lang="en-US" dirty="0"/>
+              <a:t>KPIs et </a:t>
+            </a:r>
+            <a:r>
+              <a:rPr lang="en-US" dirty="0" err="1"/>
+              <a:t>Indicateurs</a:t>
+            </a:r>
+            <a:r>
+              <a:rPr lang="en-US" dirty="0"/>
+              <a:t> </a:t>
+            </a:r>
+            <a:r>
+              <a:rPr lang="en-US" dirty="0" err="1"/>
+              <a:t>Clés</a:t>
+            </a:r>
+            <a:endParaRPr lang="en-US" dirty="0"/>
+          </a:p>
+          <a:p>
+            <a:pPr marL="457200" indent="-457200">
+              <a:buFont typeface="Calibri" panose="020F0502020204030204" pitchFamily="34" charset="0"/>
+              <a:buAutoNum type="arabicPeriod"/>
+            </a:pPr>
+            <a:r>
+              <a:rPr lang="en-US" dirty="0" err="1"/>
+              <a:t>Analyse</a:t>
+            </a:r>
+            <a:r>
+              <a:rPr lang="en-US" dirty="0"/>
+              <a:t> des Ventes</a:t>
             </a:r>
           </a:p>
           <a:p>
@@ -33409,8 +33452,42 @@
               <a:buAutoNum type="arabicPeriod"/>
             </a:pPr>
             <a:r>
-              <a:rPr lang="en-US"/>
-              <a:t>Analyse des Ventes</a:t>
+              <a:rPr lang="en-US" dirty="0"/>
+              <a:t>Analyses </a:t>
+            </a:r>
+            <a:r>
+              <a:rPr lang="en-US" dirty="0" err="1"/>
+              <a:t>complémentaires</a:t>
+            </a:r>
+            <a:endParaRPr lang="en-US" dirty="0"/>
+          </a:p>
+          <a:p>
+            <a:pPr marL="457200" indent="-457200">
+              <a:buFont typeface="Calibri" panose="020F0502020204030204" pitchFamily="34" charset="0"/>
+              <a:buAutoNum type="arabicPeriod"/>
+            </a:pPr>
+            <a:r>
+              <a:rPr lang="en-US" dirty="0" err="1"/>
+              <a:t>Analyse</a:t>
+            </a:r>
+            <a:r>
+              <a:rPr lang="en-US" dirty="0"/>
+              <a:t> des </a:t>
+            </a:r>
+            <a:r>
+              <a:rPr lang="en-US" dirty="0" err="1"/>
+              <a:t>Corrélations</a:t>
+            </a:r>
+            <a:endParaRPr lang="en-US" dirty="0"/>
+          </a:p>
+          <a:p>
+            <a:pPr marL="457200" indent="-457200">
+              <a:buFont typeface="Calibri" panose="020F0502020204030204" pitchFamily="34" charset="0"/>
+              <a:buAutoNum type="arabicPeriod"/>
+            </a:pPr>
+            <a:r>
+              <a:rPr lang="en-US" dirty="0"/>
+              <a:t>Conclusion</a:t>
             </a:r>
           </a:p>
           <a:p>
@@ -33419,39 +33496,10 @@
               <a:buAutoNum type="arabicPeriod"/>
             </a:pPr>
             <a:r>
-              <a:rPr lang="en-US"/>
-              <a:t>Analyses complémentaires</a:t>
-            </a:r>
-          </a:p>
-          <a:p>
-            <a:pPr marL="457200" indent="-457200">
-              <a:buFont typeface="Calibri" panose="020F0502020204030204" pitchFamily="34" charset="0"/>
-              <a:buAutoNum type="arabicPeriod"/>
-            </a:pPr>
-            <a:r>
-              <a:rPr lang="en-US"/>
-              <a:t>Analyse des Corrélations</a:t>
-            </a:r>
-          </a:p>
-          <a:p>
-            <a:pPr marL="457200" indent="-457200">
-              <a:buFont typeface="Calibri" panose="020F0502020204030204" pitchFamily="34" charset="0"/>
-              <a:buAutoNum type="arabicPeriod"/>
-            </a:pPr>
-            <a:r>
-              <a:rPr lang="en-US"/>
+              <a:rPr lang="en-US" dirty="0" err="1"/>
               <a:t>Recommandations</a:t>
             </a:r>
-          </a:p>
-          <a:p>
-            <a:pPr marL="457200" indent="-457200">
-              <a:buFont typeface="Calibri" panose="020F0502020204030204" pitchFamily="34" charset="0"/>
-              <a:buAutoNum type="arabicPeriod"/>
-            </a:pPr>
-            <a:r>
-              <a:rPr lang="en-US"/>
-              <a:t>Conclusion</a:t>
-            </a:r>
+            <a:endParaRPr lang="en-US" dirty="0"/>
           </a:p>
         </p:txBody>
       </p:sp>
@@ -36003,7 +36051,7 @@
             <p:ph sz="half" idx="2"/>
             <p:extLst>
               <p:ext uri="{D42A27DB-BD31-4B8C-83A1-F6EECF244321}">
-                <p14:modId xmlns:p14="http://schemas.microsoft.com/office/powerpoint/2010/main" val="2762184068"/>
+                <p14:modId xmlns:p14="http://schemas.microsoft.com/office/powerpoint/2010/main" val="3299771627"/>
               </p:ext>
             </p:extLst>
           </p:nvPr>
@@ -37091,7 +37139,7 @@
             <p:ph sz="half" idx="1"/>
             <p:extLst>
               <p:ext uri="{D42A27DB-BD31-4B8C-83A1-F6EECF244321}">
-                <p14:modId xmlns:p14="http://schemas.microsoft.com/office/powerpoint/2010/main" val="3388170828"/>
+                <p14:modId xmlns:p14="http://schemas.microsoft.com/office/powerpoint/2010/main" val="2108098965"/>
               </p:ext>
             </p:extLst>
           </p:nvPr>
@@ -37562,14 +37610,14 @@
             <p:ph sz="half" idx="2"/>
             <p:extLst>
               <p:ext uri="{D42A27DB-BD31-4B8C-83A1-F6EECF244321}">
-                <p14:modId xmlns:p14="http://schemas.microsoft.com/office/powerpoint/2010/main" val="121354109"/>
+                <p14:modId xmlns:p14="http://schemas.microsoft.com/office/powerpoint/2010/main" val="3432734241"/>
               </p:ext>
             </p:extLst>
           </p:nvPr>
         </p:nvGraphicFramePr>
         <p:xfrm>
-          <a:off x="4741863" y="639763"/>
-          <a:ext cx="6797675" cy="5649912"/>
+          <a:off x="4741863" y="639762"/>
+          <a:ext cx="6797675" cy="5984773"/>
         </p:xfrm>
         <a:graphic>
           <a:graphicData uri="http://schemas.openxmlformats.org/drawingml/2006/diagram">
@@ -39553,7 +39601,7 @@
       </p:grpSpPr>
       <p:sp>
         <p:nvSpPr>
-          <p:cNvPr id="13" name="Rectangle 12">
+          <p:cNvPr id="32" name="Rectangle 31">
             <a:extLst>
               <a:ext uri="{FF2B5EF4-FFF2-40B4-BE49-F238E27FC236}">
                 <a16:creationId xmlns:a16="http://schemas.microsoft.com/office/drawing/2014/main" id="{26D75EE5-57FF-4D1E-B105-A6036B0FE6BD}"/>
@@ -39615,7 +39663,7 @@
       </p:sp>
       <p:sp>
         <p:nvSpPr>
-          <p:cNvPr id="15" name="Rectangle 14">
+          <p:cNvPr id="34" name="Rectangle 33">
             <a:extLst>
               <a:ext uri="{FF2B5EF4-FFF2-40B4-BE49-F238E27FC236}">
                 <a16:creationId xmlns:a16="http://schemas.microsoft.com/office/drawing/2014/main" id="{C913828F-06C6-4172-B0DE-BAB0120201D3}"/>
@@ -39677,7 +39725,7 @@
       </p:sp>
       <p:cxnSp>
         <p:nvCxnSpPr>
-          <p:cNvPr id="17" name="Straight Connector 16">
+          <p:cNvPr id="36" name="Straight Connector 35">
             <a:extLst>
               <a:ext uri="{FF2B5EF4-FFF2-40B4-BE49-F238E27FC236}">
                 <a16:creationId xmlns:a16="http://schemas.microsoft.com/office/drawing/2014/main" id="{0CB2A3A6-962C-4D7A-8272-EDEDD881F07E}"/>
@@ -39732,7 +39780,7 @@
       </p:cxnSp>
       <p:sp useBgFill="1">
         <p:nvSpPr>
-          <p:cNvPr id="19" name="Rectangle 18">
+          <p:cNvPr id="38" name="Rectangle 37">
             <a:extLst>
               <a:ext uri="{FF2B5EF4-FFF2-40B4-BE49-F238E27FC236}">
                 <a16:creationId xmlns:a16="http://schemas.microsoft.com/office/drawing/2014/main" id="{21348D5E-A2F9-4457-85D6-EF33B01C1B86}"/>
@@ -39876,7 +39924,7 @@
               <a:t>• top et flop des </a:t>
             </a:r>
             <a:r>
-              <a:rPr lang="en-US" cap="all" spc="200" dirty="0" err="1">
+              <a:rPr lang="en-US" cap="all" spc="200">
                 <a:solidFill>
                   <a:schemeClr val="tx1">
                     <a:lumMod val="85000"/>
@@ -39900,7 +39948,7 @@
               <a:t> </a:t>
             </a:r>
             <a:r>
-              <a:rPr lang="en-US" cap="all" spc="200" dirty="0" err="1">
+              <a:rPr lang="en-US" cap="all" spc="200">
                 <a:solidFill>
                   <a:schemeClr val="tx1">
                     <a:lumMod val="85000"/>
@@ -39925,10 +39973,10 @@
       </p:sp>
       <p:pic>
         <p:nvPicPr>
-          <p:cNvPr id="5" name="Image 4">
+          <p:cNvPr id="6" name="Image 5">
             <a:extLst>
               <a:ext uri="{FF2B5EF4-FFF2-40B4-BE49-F238E27FC236}">
-                <a16:creationId xmlns:a16="http://schemas.microsoft.com/office/drawing/2014/main" id="{033248E3-B25F-CD0F-61A2-BE059AF1FC39}"/>
+                <a16:creationId xmlns:a16="http://schemas.microsoft.com/office/drawing/2014/main" id="{A42C64F6-DD32-C444-41C1-A9EF54DC1C6C}"/>
               </a:ext>
             </a:extLst>
           </p:cNvPr>
@@ -39955,7 +40003,7 @@
       </p:pic>
       <p:sp>
         <p:nvSpPr>
-          <p:cNvPr id="21" name="Rectangle 20">
+          <p:cNvPr id="40" name="Rectangle 39">
             <a:extLst>
               <a:ext uri="{FF2B5EF4-FFF2-40B4-BE49-F238E27FC236}">
                 <a16:creationId xmlns:a16="http://schemas.microsoft.com/office/drawing/2014/main" id="{62E5679E-AF9A-4675-8EB9-82F877C47B17}"/>
@@ -40045,7 +40093,7 @@
       </p:pic>
       <p:cxnSp>
         <p:nvCxnSpPr>
-          <p:cNvPr id="23" name="Straight Connector 22">
+          <p:cNvPr id="42" name="Straight Connector 41">
             <a:extLst>
               <a:ext uri="{FF2B5EF4-FFF2-40B4-BE49-F238E27FC236}">
                 <a16:creationId xmlns:a16="http://schemas.microsoft.com/office/drawing/2014/main" id="{A4193D27-0DF9-4485-90D7-D8E69A3F4459}"/>
@@ -40099,7 +40147,7 @@
       </p:cxnSp>
       <p:sp>
         <p:nvSpPr>
-          <p:cNvPr id="25" name="Rectangle 24">
+          <p:cNvPr id="44" name="Rectangle 43">
             <a:extLst>
               <a:ext uri="{FF2B5EF4-FFF2-40B4-BE49-F238E27FC236}">
                 <a16:creationId xmlns:a16="http://schemas.microsoft.com/office/drawing/2014/main" id="{7EF5A4DD-17B0-415A-8F3A-0DEE3FF8F8C5}"/>
@@ -40161,7 +40209,7 @@
       </p:sp>
       <p:sp>
         <p:nvSpPr>
-          <p:cNvPr id="27" name="Rectangle 26">
+          <p:cNvPr id="46" name="Rectangle 45">
             <a:extLst>
               <a:ext uri="{FF2B5EF4-FFF2-40B4-BE49-F238E27FC236}">
                 <a16:creationId xmlns:a16="http://schemas.microsoft.com/office/drawing/2014/main" id="{4AA73B4A-2570-4D18-9566-12E68828C417}"/>

</xml_diff>

<commit_message>
ajout formules maths (essai)
</commit_message>
<xml_diff>
--- a/presentation_BENMAHAMMED_Oussama_Lapage.pptx
+++ b/presentation_BENMAHAMMED_Oussama_Lapage.pptx
@@ -29005,6 +29005,126 @@
           </a:p>
         </p:txBody>
       </p:sp>
+      <p:pic>
+        <p:nvPicPr>
+          <p:cNvPr id="5" name="Image 4">
+            <a:extLst>
+              <a:ext uri="{FF2B5EF4-FFF2-40B4-BE49-F238E27FC236}">
+                <a16:creationId xmlns:a16="http://schemas.microsoft.com/office/drawing/2014/main" id="{C289F9EF-7852-EB95-922D-4F9344CD80B0}"/>
+              </a:ext>
+            </a:extLst>
+          </p:cNvPr>
+          <p:cNvPicPr>
+            <a:picLocks noChangeAspect="1"/>
+          </p:cNvPicPr>
+          <p:nvPr/>
+        </p:nvPicPr>
+        <p:blipFill>
+          <a:blip r:embed="rId3"/>
+          <a:stretch>
+            <a:fillRect/>
+          </a:stretch>
+        </p:blipFill>
+        <p:spPr>
+          <a:xfrm>
+            <a:off x="6411684" y="3779774"/>
+            <a:ext cx="1019175" cy="504825"/>
+          </a:xfrm>
+          <a:prstGeom prst="rect">
+            <a:avLst/>
+          </a:prstGeom>
+        </p:spPr>
+      </p:pic>
+      <p:pic>
+        <p:nvPicPr>
+          <p:cNvPr id="8" name="Image 7">
+            <a:extLst>
+              <a:ext uri="{FF2B5EF4-FFF2-40B4-BE49-F238E27FC236}">
+                <a16:creationId xmlns:a16="http://schemas.microsoft.com/office/drawing/2014/main" id="{6ED140F5-339A-3E5C-2062-64AE4AD425FB}"/>
+              </a:ext>
+            </a:extLst>
+          </p:cNvPr>
+          <p:cNvPicPr>
+            <a:picLocks noChangeAspect="1"/>
+          </p:cNvPicPr>
+          <p:nvPr/>
+        </p:nvPicPr>
+        <p:blipFill>
+          <a:blip r:embed="rId4"/>
+          <a:stretch>
+            <a:fillRect/>
+          </a:stretch>
+        </p:blipFill>
+        <p:spPr>
+          <a:xfrm>
+            <a:off x="6411684" y="4879370"/>
+            <a:ext cx="1647825" cy="638175"/>
+          </a:xfrm>
+          <a:prstGeom prst="rect">
+            <a:avLst/>
+          </a:prstGeom>
+        </p:spPr>
+      </p:pic>
+      <p:pic>
+        <p:nvPicPr>
+          <p:cNvPr id="10" name="Image 9">
+            <a:extLst>
+              <a:ext uri="{FF2B5EF4-FFF2-40B4-BE49-F238E27FC236}">
+                <a16:creationId xmlns:a16="http://schemas.microsoft.com/office/drawing/2014/main" id="{9370FA65-2D67-976A-DFC6-9F3213CBA4D0}"/>
+              </a:ext>
+            </a:extLst>
+          </p:cNvPr>
+          <p:cNvPicPr>
+            <a:picLocks noChangeAspect="1"/>
+          </p:cNvPicPr>
+          <p:nvPr/>
+        </p:nvPicPr>
+        <p:blipFill>
+          <a:blip r:embed="rId5"/>
+          <a:stretch>
+            <a:fillRect/>
+          </a:stretch>
+        </p:blipFill>
+        <p:spPr>
+          <a:xfrm>
+            <a:off x="6411684" y="4320173"/>
+            <a:ext cx="4467225" cy="609600"/>
+          </a:xfrm>
+          <a:prstGeom prst="rect">
+            <a:avLst/>
+          </a:prstGeom>
+        </p:spPr>
+      </p:pic>
+      <p:pic>
+        <p:nvPicPr>
+          <p:cNvPr id="12" name="Image 11">
+            <a:extLst>
+              <a:ext uri="{FF2B5EF4-FFF2-40B4-BE49-F238E27FC236}">
+                <a16:creationId xmlns:a16="http://schemas.microsoft.com/office/drawing/2014/main" id="{286B6B87-A3D9-4523-CFAB-9535C3A84CE5}"/>
+              </a:ext>
+            </a:extLst>
+          </p:cNvPr>
+          <p:cNvPicPr>
+            <a:picLocks noChangeAspect="1"/>
+          </p:cNvPicPr>
+          <p:nvPr/>
+        </p:nvPicPr>
+        <p:blipFill>
+          <a:blip r:embed="rId6"/>
+          <a:stretch>
+            <a:fillRect/>
+          </a:stretch>
+        </p:blipFill>
+        <p:spPr>
+          <a:xfrm>
+            <a:off x="6411684" y="5461074"/>
+            <a:ext cx="5780316" cy="571500"/>
+          </a:xfrm>
+          <a:prstGeom prst="rect">
+            <a:avLst/>
+          </a:prstGeom>
+        </p:spPr>
+      </p:pic>
     </p:spTree>
     <p:extLst>
       <p:ext uri="{BB962C8B-B14F-4D97-AF65-F5344CB8AC3E}">
@@ -31384,8 +31504,96 @@
               <a:buNone/>
             </a:pPr>
             <a:r>
-              <a:rPr lang="en-US"/>
-              <a:t>P-value très faible indique que les différences observées ne sont probablement pas dues au hasard, et qu'il existe une relation significative entre ces variables.</a:t>
+              <a:rPr lang="en-US" dirty="0"/>
+              <a:t>P-value très </a:t>
+            </a:r>
+            <a:r>
+              <a:rPr lang="en-US" dirty="0" err="1"/>
+              <a:t>faible</a:t>
+            </a:r>
+            <a:r>
+              <a:rPr lang="en-US" dirty="0"/>
+              <a:t> </a:t>
+            </a:r>
+            <a:r>
+              <a:rPr lang="en-US" dirty="0" err="1"/>
+              <a:t>indique</a:t>
+            </a:r>
+            <a:r>
+              <a:rPr lang="en-US" dirty="0"/>
+              <a:t> que les </a:t>
+            </a:r>
+            <a:r>
+              <a:rPr lang="en-US" dirty="0" err="1"/>
+              <a:t>différences</a:t>
+            </a:r>
+            <a:r>
+              <a:rPr lang="en-US" dirty="0"/>
+              <a:t> </a:t>
+            </a:r>
+            <a:r>
+              <a:rPr lang="en-US" dirty="0" err="1"/>
+              <a:t>observées</a:t>
+            </a:r>
+            <a:r>
+              <a:rPr lang="en-US" dirty="0"/>
+              <a:t> ne </a:t>
+            </a:r>
+            <a:r>
+              <a:rPr lang="en-US" dirty="0" err="1"/>
+              <a:t>sont</a:t>
+            </a:r>
+            <a:r>
+              <a:rPr lang="en-US" dirty="0"/>
+              <a:t> </a:t>
+            </a:r>
+            <a:r>
+              <a:rPr lang="en-US" dirty="0" err="1"/>
+              <a:t>probablement</a:t>
+            </a:r>
+            <a:r>
+              <a:rPr lang="en-US" dirty="0"/>
+              <a:t> pas dues au </a:t>
+            </a:r>
+            <a:r>
+              <a:rPr lang="en-US" dirty="0" err="1"/>
+              <a:t>hasard</a:t>
+            </a:r>
+            <a:r>
+              <a:rPr lang="en-US" dirty="0"/>
+              <a:t>, et </a:t>
+            </a:r>
+            <a:r>
+              <a:rPr lang="en-US" dirty="0" err="1"/>
+              <a:t>qu'il</a:t>
+            </a:r>
+            <a:r>
+              <a:rPr lang="en-US" dirty="0"/>
+              <a:t> </a:t>
+            </a:r>
+            <a:r>
+              <a:rPr lang="en-US" dirty="0" err="1"/>
+              <a:t>existe</a:t>
+            </a:r>
+            <a:r>
+              <a:rPr lang="en-US" dirty="0"/>
+              <a:t> </a:t>
+            </a:r>
+            <a:r>
+              <a:rPr lang="en-US" dirty="0" err="1"/>
+              <a:t>une</a:t>
+            </a:r>
+            <a:r>
+              <a:rPr lang="en-US" dirty="0"/>
+              <a:t> relation significative entre </a:t>
+            </a:r>
+            <a:r>
+              <a:rPr lang="en-US" dirty="0" err="1"/>
+              <a:t>ces</a:t>
+            </a:r>
+            <a:r>
+              <a:rPr lang="en-US" dirty="0"/>
+              <a:t> variables.</a:t>
             </a:r>
             <a:endParaRPr lang="en-US" cap="all" spc="200" dirty="0"/>
           </a:p>
@@ -31522,6 +31730,66 @@
           </a:p>
         </p:txBody>
       </p:sp>
+      <p:pic>
+        <p:nvPicPr>
+          <p:cNvPr id="5" name="Image 4">
+            <a:extLst>
+              <a:ext uri="{FF2B5EF4-FFF2-40B4-BE49-F238E27FC236}">
+                <a16:creationId xmlns:a16="http://schemas.microsoft.com/office/drawing/2014/main" id="{A90B3738-A829-18F3-706E-58007F2A8C72}"/>
+              </a:ext>
+            </a:extLst>
+          </p:cNvPr>
+          <p:cNvPicPr>
+            <a:picLocks noChangeAspect="1"/>
+          </p:cNvPicPr>
+          <p:nvPr/>
+        </p:nvPicPr>
+        <p:blipFill>
+          <a:blip r:embed="rId3"/>
+          <a:stretch>
+            <a:fillRect/>
+          </a:stretch>
+        </p:blipFill>
+        <p:spPr>
+          <a:xfrm>
+            <a:off x="212457" y="5587569"/>
+            <a:ext cx="1962150" cy="628650"/>
+          </a:xfrm>
+          <a:prstGeom prst="rect">
+            <a:avLst/>
+          </a:prstGeom>
+        </p:spPr>
+      </p:pic>
+      <p:pic>
+        <p:nvPicPr>
+          <p:cNvPr id="7" name="Image 6">
+            <a:extLst>
+              <a:ext uri="{FF2B5EF4-FFF2-40B4-BE49-F238E27FC236}">
+                <a16:creationId xmlns:a16="http://schemas.microsoft.com/office/drawing/2014/main" id="{ED0E3B30-D0A2-9FBD-13DA-9B7FE8B6EEF0}"/>
+              </a:ext>
+            </a:extLst>
+          </p:cNvPr>
+          <p:cNvPicPr>
+            <a:picLocks noChangeAspect="1"/>
+          </p:cNvPicPr>
+          <p:nvPr/>
+        </p:nvPicPr>
+        <p:blipFill>
+          <a:blip r:embed="rId4"/>
+          <a:stretch>
+            <a:fillRect/>
+          </a:stretch>
+        </p:blipFill>
+        <p:spPr>
+          <a:xfrm>
+            <a:off x="2387064" y="5612940"/>
+            <a:ext cx="5543550" cy="581025"/>
+          </a:xfrm>
+          <a:prstGeom prst="rect">
+            <a:avLst/>
+          </a:prstGeom>
+        </p:spPr>
+      </p:pic>
     </p:spTree>
     <p:extLst>
       <p:ext uri="{BB962C8B-B14F-4D97-AF65-F5344CB8AC3E}">
@@ -32803,6 +33071,66 @@
           </a:graphicData>
         </a:graphic>
       </p:graphicFrame>
+      <p:pic>
+        <p:nvPicPr>
+          <p:cNvPr id="5" name="Image 4">
+            <a:extLst>
+              <a:ext uri="{FF2B5EF4-FFF2-40B4-BE49-F238E27FC236}">
+                <a16:creationId xmlns:a16="http://schemas.microsoft.com/office/drawing/2014/main" id="{48CE14AA-70F9-9832-D0D2-6AE6FC0F921C}"/>
+              </a:ext>
+            </a:extLst>
+          </p:cNvPr>
+          <p:cNvPicPr>
+            <a:picLocks noChangeAspect="1"/>
+          </p:cNvPicPr>
+          <p:nvPr/>
+        </p:nvPicPr>
+        <p:blipFill>
+          <a:blip r:embed="rId8"/>
+          <a:stretch>
+            <a:fillRect/>
+          </a:stretch>
+        </p:blipFill>
+        <p:spPr>
+          <a:xfrm>
+            <a:off x="68330" y="5479545"/>
+            <a:ext cx="1704975" cy="685800"/>
+          </a:xfrm>
+          <a:prstGeom prst="rect">
+            <a:avLst/>
+          </a:prstGeom>
+        </p:spPr>
+      </p:pic>
+      <p:pic>
+        <p:nvPicPr>
+          <p:cNvPr id="8" name="Image 7">
+            <a:extLst>
+              <a:ext uri="{FF2B5EF4-FFF2-40B4-BE49-F238E27FC236}">
+                <a16:creationId xmlns:a16="http://schemas.microsoft.com/office/drawing/2014/main" id="{05C7788F-5FE3-D5CB-C516-5B4A7F501B2D}"/>
+              </a:ext>
+            </a:extLst>
+          </p:cNvPr>
+          <p:cNvPicPr>
+            <a:picLocks noChangeAspect="1"/>
+          </p:cNvPicPr>
+          <p:nvPr/>
+        </p:nvPicPr>
+        <p:blipFill>
+          <a:blip r:embed="rId9"/>
+          <a:stretch>
+            <a:fillRect/>
+          </a:stretch>
+        </p:blipFill>
+        <p:spPr>
+          <a:xfrm>
+            <a:off x="1881254" y="5404684"/>
+            <a:ext cx="4748808" cy="828675"/>
+          </a:xfrm>
+          <a:prstGeom prst="rect">
+            <a:avLst/>
+          </a:prstGeom>
+        </p:spPr>
+      </p:pic>
     </p:spTree>
     <p:extLst>
       <p:ext uri="{BB962C8B-B14F-4D97-AF65-F5344CB8AC3E}">

</xml_diff>